<commit_message>
Corrected typos in command titles
</commit_message>
<xml_diff>
--- a/Temp/Scheme and pictures.pptx
+++ b/Temp/Scheme and pictures.pptx
@@ -7,6 +7,11 @@
   <p:sldIdLst>
     <p:sldId id="256" r:id="rId2"/>
     <p:sldId id="257" r:id="rId3"/>
+    <p:sldId id="258" r:id="rId4"/>
+    <p:sldId id="259" r:id="rId5"/>
+    <p:sldId id="260" r:id="rId6"/>
+    <p:sldId id="261" r:id="rId7"/>
+    <p:sldId id="262" r:id="rId8"/>
   </p:sldIdLst>
   <p:sldSz cx="12192000" cy="6858000"/>
   <p:notesSz cx="6858000" cy="9144000"/>
@@ -105,20 +110,33 @@
       </a:defRPr>
     </a:lvl9pPr>
   </p:defaultTextStyle>
+  <p:extLst>
+    <p:ext uri="{EFAFB233-063F-42B5-8137-9DF3F51BA10A}">
+      <p15:sldGuideLst xmlns:p15="http://schemas.microsoft.com/office/powerpoint/2012/main"/>
+    </p:ext>
+  </p:extLst>
 </p:presentation>
+</file>
+
+<file path=ppt/revisionInfo.xml><?xml version="1.0" encoding="utf-8"?>
+<p1510:revInfo xmlns:a="http://schemas.openxmlformats.org/drawingml/2006/main" xmlns:r="http://schemas.openxmlformats.org/officeDocument/2006/relationships" xmlns:p1510="http://schemas.microsoft.com/office/powerpoint/2015/10/main">
+  <p1510:revLst>
+    <p1510:client id="{7952FB6B-E4B5-4CA9-B838-8CFA95871397}" v="19" dt="2023-11-02T23:10:14.299"/>
+  </p1510:revLst>
+</p1510:revInfo>
 </file>
 
 <file path=ppt/changesInfos/changesInfo1.xml><?xml version="1.0" encoding="utf-8"?>
 <pc:chgInfo xmlns:a="http://schemas.openxmlformats.org/drawingml/2006/main" xmlns:r="http://schemas.openxmlformats.org/officeDocument/2006/relationships" xmlns:ac="http://schemas.microsoft.com/office/drawing/2013/main/command" xmlns:pc="http://schemas.microsoft.com/office/powerpoint/2013/main/command">
   <pc:docChgLst>
     <pc:chgData name="Paul Ebbers" userId="68d1a23b9a453310" providerId="LiveId" clId="{7952FB6B-E4B5-4CA9-B838-8CFA95871397}"/>
-    <pc:docChg chg="custSel addSld modSld">
-      <pc:chgData name="Paul Ebbers" userId="68d1a23b9a453310" providerId="LiveId" clId="{7952FB6B-E4B5-4CA9-B838-8CFA95871397}" dt="2023-11-02T20:31:53.086" v="4" actId="1076"/>
+    <pc:docChg chg="undo custSel addSld modSld">
+      <pc:chgData name="Paul Ebbers" userId="68d1a23b9a453310" providerId="LiveId" clId="{7952FB6B-E4B5-4CA9-B838-8CFA95871397}" dt="2023-11-02T23:10:39.751" v="146" actId="1076"/>
       <pc:docMkLst>
         <pc:docMk/>
       </pc:docMkLst>
-      <pc:sldChg chg="delSp modSp add mod">
-        <pc:chgData name="Paul Ebbers" userId="68d1a23b9a453310" providerId="LiveId" clId="{7952FB6B-E4B5-4CA9-B838-8CFA95871397}" dt="2023-11-02T20:31:53.086" v="4" actId="1076"/>
+      <pc:sldChg chg="addSp delSp modSp add mod">
+        <pc:chgData name="Paul Ebbers" userId="68d1a23b9a453310" providerId="LiveId" clId="{7952FB6B-E4B5-4CA9-B838-8CFA95871397}" dt="2023-11-02T21:56:37.730" v="17" actId="21"/>
         <pc:sldMkLst>
           <pc:docMk/>
           <pc:sldMk cId="4104228159" sldId="257"/>
@@ -155,6 +173,433 @@
             <ac:spMk id="43" creationId="{970392BD-5D1C-C27E-C1CB-78ED716A716C}"/>
           </ac:spMkLst>
         </pc:spChg>
+        <pc:picChg chg="add del mod">
+          <ac:chgData name="Paul Ebbers" userId="68d1a23b9a453310" providerId="LiveId" clId="{7952FB6B-E4B5-4CA9-B838-8CFA95871397}" dt="2023-11-02T21:56:37.730" v="17" actId="21"/>
+          <ac:picMkLst>
+            <pc:docMk/>
+            <pc:sldMk cId="4104228159" sldId="257"/>
+            <ac:picMk id="2" creationId="{E362A61D-C5FC-EA3A-0EDE-96D5D1739FD0}"/>
+          </ac:picMkLst>
+        </pc:picChg>
+      </pc:sldChg>
+      <pc:sldChg chg="addSp delSp modSp add mod">
+        <pc:chgData name="Paul Ebbers" userId="68d1a23b9a453310" providerId="LiveId" clId="{7952FB6B-E4B5-4CA9-B838-8CFA95871397}" dt="2023-11-02T21:57:42.929" v="28" actId="20577"/>
+        <pc:sldMkLst>
+          <pc:docMk/>
+          <pc:sldMk cId="2299650287" sldId="258"/>
+        </pc:sldMkLst>
+        <pc:spChg chg="mod">
+          <ac:chgData name="Paul Ebbers" userId="68d1a23b9a453310" providerId="LiveId" clId="{7952FB6B-E4B5-4CA9-B838-8CFA95871397}" dt="2023-11-02T21:57:28.311" v="24" actId="1076"/>
+          <ac:spMkLst>
+            <pc:docMk/>
+            <pc:sldMk cId="2299650287" sldId="258"/>
+            <ac:spMk id="24" creationId="{A8919692-C2FF-3153-25FC-A8A3E8C21B41}"/>
+          </ac:spMkLst>
+        </pc:spChg>
+        <pc:spChg chg="mod">
+          <ac:chgData name="Paul Ebbers" userId="68d1a23b9a453310" providerId="LiveId" clId="{7952FB6B-E4B5-4CA9-B838-8CFA95871397}" dt="2023-11-02T21:57:22.454" v="23" actId="1076"/>
+          <ac:spMkLst>
+            <pc:docMk/>
+            <pc:sldMk cId="2299650287" sldId="258"/>
+            <ac:spMk id="25" creationId="{7A37F27E-4223-F46E-09AB-3749E7334A83}"/>
+          </ac:spMkLst>
+        </pc:spChg>
+        <pc:spChg chg="mod">
+          <ac:chgData name="Paul Ebbers" userId="68d1a23b9a453310" providerId="LiveId" clId="{7952FB6B-E4B5-4CA9-B838-8CFA95871397}" dt="2023-11-02T21:57:42.929" v="28" actId="20577"/>
+          <ac:spMkLst>
+            <pc:docMk/>
+            <pc:sldMk cId="2299650287" sldId="258"/>
+            <ac:spMk id="26" creationId="{C6D3B01D-973E-5342-356B-41B31A34F7F8}"/>
+          </ac:spMkLst>
+        </pc:spChg>
+        <pc:picChg chg="add del mod">
+          <ac:chgData name="Paul Ebbers" userId="68d1a23b9a453310" providerId="LiveId" clId="{7952FB6B-E4B5-4CA9-B838-8CFA95871397}" dt="2023-11-02T21:55:58.591" v="11" actId="478"/>
+          <ac:picMkLst>
+            <pc:docMk/>
+            <pc:sldMk cId="2299650287" sldId="258"/>
+            <ac:picMk id="3" creationId="{27C82F87-346A-18E9-BCFE-30CE562EC594}"/>
+          </ac:picMkLst>
+        </pc:picChg>
+        <pc:picChg chg="del">
+          <ac:chgData name="Paul Ebbers" userId="68d1a23b9a453310" providerId="LiveId" clId="{7952FB6B-E4B5-4CA9-B838-8CFA95871397}" dt="2023-11-02T21:55:35.048" v="6" actId="478"/>
+          <ac:picMkLst>
+            <pc:docMk/>
+            <pc:sldMk cId="2299650287" sldId="258"/>
+            <ac:picMk id="5" creationId="{85B03660-EA31-DF53-2EBF-F9627C3F5BED}"/>
+          </ac:picMkLst>
+        </pc:picChg>
+        <pc:picChg chg="add del">
+          <ac:chgData name="Paul Ebbers" userId="68d1a23b9a453310" providerId="LiveId" clId="{7952FB6B-E4B5-4CA9-B838-8CFA95871397}" dt="2023-11-02T21:56:25.065" v="13" actId="21"/>
+          <ac:picMkLst>
+            <pc:docMk/>
+            <pc:sldMk cId="2299650287" sldId="258"/>
+            <ac:picMk id="6" creationId="{66B03434-923F-5DD4-0CC1-A18A92AA9D02}"/>
+          </ac:picMkLst>
+        </pc:picChg>
+        <pc:picChg chg="add mod ord">
+          <ac:chgData name="Paul Ebbers" userId="68d1a23b9a453310" providerId="LiveId" clId="{7952FB6B-E4B5-4CA9-B838-8CFA95871397}" dt="2023-11-02T21:56:54.732" v="21" actId="167"/>
+          <ac:picMkLst>
+            <pc:docMk/>
+            <pc:sldMk cId="2299650287" sldId="258"/>
+            <ac:picMk id="7" creationId="{82F610C1-8AC9-018E-0629-8E2DA180132D}"/>
+          </ac:picMkLst>
+        </pc:picChg>
+      </pc:sldChg>
+      <pc:sldChg chg="addSp delSp modSp add mod">
+        <pc:chgData name="Paul Ebbers" userId="68d1a23b9a453310" providerId="LiveId" clId="{7952FB6B-E4B5-4CA9-B838-8CFA95871397}" dt="2023-11-02T22:14:11.051" v="39" actId="1076"/>
+        <pc:sldMkLst>
+          <pc:docMk/>
+          <pc:sldMk cId="3500793818" sldId="259"/>
+        </pc:sldMkLst>
+        <pc:spChg chg="mod">
+          <ac:chgData name="Paul Ebbers" userId="68d1a23b9a453310" providerId="LiveId" clId="{7952FB6B-E4B5-4CA9-B838-8CFA95871397}" dt="2023-11-02T22:14:03.557" v="38" actId="1076"/>
+          <ac:spMkLst>
+            <pc:docMk/>
+            <pc:sldMk cId="3500793818" sldId="259"/>
+            <ac:spMk id="24" creationId="{A8919692-C2FF-3153-25FC-A8A3E8C21B41}"/>
+          </ac:spMkLst>
+        </pc:spChg>
+        <pc:spChg chg="mod">
+          <ac:chgData name="Paul Ebbers" userId="68d1a23b9a453310" providerId="LiveId" clId="{7952FB6B-E4B5-4CA9-B838-8CFA95871397}" dt="2023-11-02T22:14:11.051" v="39" actId="1076"/>
+          <ac:spMkLst>
+            <pc:docMk/>
+            <pc:sldMk cId="3500793818" sldId="259"/>
+            <ac:spMk id="25" creationId="{7A37F27E-4223-F46E-09AB-3749E7334A83}"/>
+          </ac:spMkLst>
+        </pc:spChg>
+        <pc:spChg chg="del">
+          <ac:chgData name="Paul Ebbers" userId="68d1a23b9a453310" providerId="LiveId" clId="{7952FB6B-E4B5-4CA9-B838-8CFA95871397}" dt="2023-11-02T22:13:51.322" v="37" actId="478"/>
+          <ac:spMkLst>
+            <pc:docMk/>
+            <pc:sldMk cId="3500793818" sldId="259"/>
+            <ac:spMk id="26" creationId="{C6D3B01D-973E-5342-356B-41B31A34F7F8}"/>
+          </ac:spMkLst>
+        </pc:spChg>
+        <pc:picChg chg="add mod ord">
+          <ac:chgData name="Paul Ebbers" userId="68d1a23b9a453310" providerId="LiveId" clId="{7952FB6B-E4B5-4CA9-B838-8CFA95871397}" dt="2023-11-02T22:13:40.510" v="36" actId="1076"/>
+          <ac:picMkLst>
+            <pc:docMk/>
+            <pc:sldMk cId="3500793818" sldId="259"/>
+            <ac:picMk id="3" creationId="{B06BAB10-18EF-2F15-BC35-099247EF1264}"/>
+          </ac:picMkLst>
+        </pc:picChg>
+        <pc:picChg chg="del">
+          <ac:chgData name="Paul Ebbers" userId="68d1a23b9a453310" providerId="LiveId" clId="{7952FB6B-E4B5-4CA9-B838-8CFA95871397}" dt="2023-11-02T22:13:28.085" v="33" actId="478"/>
+          <ac:picMkLst>
+            <pc:docMk/>
+            <pc:sldMk cId="3500793818" sldId="259"/>
+            <ac:picMk id="7" creationId="{82F610C1-8AC9-018E-0629-8E2DA180132D}"/>
+          </ac:picMkLst>
+        </pc:picChg>
+      </pc:sldChg>
+      <pc:sldChg chg="delSp modSp mod">
+        <pc:chgData name="Paul Ebbers" userId="68d1a23b9a453310" providerId="LiveId" clId="{7952FB6B-E4B5-4CA9-B838-8CFA95871397}" dt="2023-11-02T22:29:04.360" v="42" actId="20577"/>
+        <pc:sldMkLst>
+          <pc:docMk/>
+          <pc:sldMk cId="3623053889" sldId="260"/>
+        </pc:sldMkLst>
+        <pc:spChg chg="del">
+          <ac:chgData name="Paul Ebbers" userId="68d1a23b9a453310" providerId="LiveId" clId="{7952FB6B-E4B5-4CA9-B838-8CFA95871397}" dt="2023-11-02T22:29:01.635" v="40" actId="478"/>
+          <ac:spMkLst>
+            <pc:docMk/>
+            <pc:sldMk cId="3623053889" sldId="260"/>
+            <ac:spMk id="24" creationId="{A8919692-C2FF-3153-25FC-A8A3E8C21B41}"/>
+          </ac:spMkLst>
+        </pc:spChg>
+        <pc:spChg chg="del">
+          <ac:chgData name="Paul Ebbers" userId="68d1a23b9a453310" providerId="LiveId" clId="{7952FB6B-E4B5-4CA9-B838-8CFA95871397}" dt="2023-11-02T22:29:01.635" v="40" actId="478"/>
+          <ac:spMkLst>
+            <pc:docMk/>
+            <pc:sldMk cId="3623053889" sldId="260"/>
+            <ac:spMk id="25" creationId="{7A37F27E-4223-F46E-09AB-3749E7334A83}"/>
+          </ac:spMkLst>
+        </pc:spChg>
+        <pc:spChg chg="del">
+          <ac:chgData name="Paul Ebbers" userId="68d1a23b9a453310" providerId="LiveId" clId="{7952FB6B-E4B5-4CA9-B838-8CFA95871397}" dt="2023-11-02T22:29:01.635" v="40" actId="478"/>
+          <ac:spMkLst>
+            <pc:docMk/>
+            <pc:sldMk cId="3623053889" sldId="260"/>
+            <ac:spMk id="26" creationId="{C6D3B01D-973E-5342-356B-41B31A34F7F8}"/>
+          </ac:spMkLst>
+        </pc:spChg>
+        <pc:spChg chg="mod">
+          <ac:chgData name="Paul Ebbers" userId="68d1a23b9a453310" providerId="LiveId" clId="{7952FB6B-E4B5-4CA9-B838-8CFA95871397}" dt="2023-11-02T22:29:04.360" v="42" actId="20577"/>
+          <ac:spMkLst>
+            <pc:docMk/>
+            <pc:sldMk cId="3623053889" sldId="260"/>
+            <ac:spMk id="43" creationId="{970392BD-5D1C-C27E-C1CB-78ED716A716C}"/>
+          </ac:spMkLst>
+        </pc:spChg>
+      </pc:sldChg>
+      <pc:sldChg chg="addSp delSp modSp new mod">
+        <pc:chgData name="Paul Ebbers" userId="68d1a23b9a453310" providerId="LiveId" clId="{7952FB6B-E4B5-4CA9-B838-8CFA95871397}" dt="2023-11-02T22:36:14.333" v="69" actId="21"/>
+        <pc:sldMkLst>
+          <pc:docMk/>
+          <pc:sldMk cId="945030047" sldId="261"/>
+        </pc:sldMkLst>
+        <pc:spChg chg="del">
+          <ac:chgData name="Paul Ebbers" userId="68d1a23b9a453310" providerId="LiveId" clId="{7952FB6B-E4B5-4CA9-B838-8CFA95871397}" dt="2023-11-02T22:33:10.464" v="44" actId="478"/>
+          <ac:spMkLst>
+            <pc:docMk/>
+            <pc:sldMk cId="945030047" sldId="261"/>
+            <ac:spMk id="2" creationId="{7A522860-D52B-3C42-76DB-3059E2AF4248}"/>
+          </ac:spMkLst>
+        </pc:spChg>
+        <pc:spChg chg="del">
+          <ac:chgData name="Paul Ebbers" userId="68d1a23b9a453310" providerId="LiveId" clId="{7952FB6B-E4B5-4CA9-B838-8CFA95871397}" dt="2023-11-02T22:33:12.192" v="45" actId="478"/>
+          <ac:spMkLst>
+            <pc:docMk/>
+            <pc:sldMk cId="945030047" sldId="261"/>
+            <ac:spMk id="3" creationId="{8C7C8A45-1B20-A9E4-D159-3BD8363A400B}"/>
+          </ac:spMkLst>
+        </pc:spChg>
+        <pc:spChg chg="add mod">
+          <ac:chgData name="Paul Ebbers" userId="68d1a23b9a453310" providerId="LiveId" clId="{7952FB6B-E4B5-4CA9-B838-8CFA95871397}" dt="2023-11-02T22:34:37.983" v="59" actId="1076"/>
+          <ac:spMkLst>
+            <pc:docMk/>
+            <pc:sldMk cId="945030047" sldId="261"/>
+            <ac:spMk id="6" creationId="{AD266914-7EAC-F129-EC58-F2C044ABE096}"/>
+          </ac:spMkLst>
+        </pc:spChg>
+        <pc:spChg chg="add mod">
+          <ac:chgData name="Paul Ebbers" userId="68d1a23b9a453310" providerId="LiveId" clId="{7952FB6B-E4B5-4CA9-B838-8CFA95871397}" dt="2023-11-02T22:34:46.292" v="60" actId="1076"/>
+          <ac:spMkLst>
+            <pc:docMk/>
+            <pc:sldMk cId="945030047" sldId="261"/>
+            <ac:spMk id="7" creationId="{ADFDE47A-8FD1-D65F-57F4-A2ACF3A07C3E}"/>
+          </ac:spMkLst>
+        </pc:spChg>
+        <pc:picChg chg="add mod">
+          <ac:chgData name="Paul Ebbers" userId="68d1a23b9a453310" providerId="LiveId" clId="{7952FB6B-E4B5-4CA9-B838-8CFA95871397}" dt="2023-11-02T22:36:10.598" v="68" actId="1076"/>
+          <ac:picMkLst>
+            <pc:docMk/>
+            <pc:sldMk cId="945030047" sldId="261"/>
+            <ac:picMk id="5" creationId="{600DAD0C-D7B2-A885-BD8F-D2B9D5C05578}"/>
+          </ac:picMkLst>
+        </pc:picChg>
+        <pc:picChg chg="add del mod">
+          <ac:chgData name="Paul Ebbers" userId="68d1a23b9a453310" providerId="LiveId" clId="{7952FB6B-E4B5-4CA9-B838-8CFA95871397}" dt="2023-11-02T22:36:14.333" v="69" actId="21"/>
+          <ac:picMkLst>
+            <pc:docMk/>
+            <pc:sldMk cId="945030047" sldId="261"/>
+            <ac:picMk id="9" creationId="{54C9FF95-9295-AA2D-3D09-9B3A682588E8}"/>
+          </ac:picMkLst>
+        </pc:picChg>
+        <pc:picChg chg="add del mod">
+          <ac:chgData name="Paul Ebbers" userId="68d1a23b9a453310" providerId="LiveId" clId="{7952FB6B-E4B5-4CA9-B838-8CFA95871397}" dt="2023-11-02T22:36:14.333" v="69" actId="21"/>
+          <ac:picMkLst>
+            <pc:docMk/>
+            <pc:sldMk cId="945030047" sldId="261"/>
+            <ac:picMk id="11" creationId="{32E84340-9B4A-0243-A84F-6FCC8E7F7C4F}"/>
+          </ac:picMkLst>
+        </pc:picChg>
+        <pc:picChg chg="add del mod">
+          <ac:chgData name="Paul Ebbers" userId="68d1a23b9a453310" providerId="LiveId" clId="{7952FB6B-E4B5-4CA9-B838-8CFA95871397}" dt="2023-11-02T22:36:14.333" v="69" actId="21"/>
+          <ac:picMkLst>
+            <pc:docMk/>
+            <pc:sldMk cId="945030047" sldId="261"/>
+            <ac:picMk id="13" creationId="{8AE458FC-9294-4331-AFBA-F1AED7A36EA1}"/>
+          </ac:picMkLst>
+        </pc:picChg>
+      </pc:sldChg>
+      <pc:sldChg chg="addSp delSp modSp add mod">
+        <pc:chgData name="Paul Ebbers" userId="68d1a23b9a453310" providerId="LiveId" clId="{7952FB6B-E4B5-4CA9-B838-8CFA95871397}" dt="2023-11-02T23:10:39.751" v="146" actId="1076"/>
+        <pc:sldMkLst>
+          <pc:docMk/>
+          <pc:sldMk cId="3031865952" sldId="262"/>
+        </pc:sldMkLst>
+        <pc:spChg chg="del">
+          <ac:chgData name="Paul Ebbers" userId="68d1a23b9a453310" providerId="LiveId" clId="{7952FB6B-E4B5-4CA9-B838-8CFA95871397}" dt="2023-11-02T22:36:22.262" v="71" actId="478"/>
+          <ac:spMkLst>
+            <pc:docMk/>
+            <pc:sldMk cId="3031865952" sldId="262"/>
+            <ac:spMk id="6" creationId="{AD266914-7EAC-F129-EC58-F2C044ABE096}"/>
+          </ac:spMkLst>
+        </pc:spChg>
+        <pc:spChg chg="del">
+          <ac:chgData name="Paul Ebbers" userId="68d1a23b9a453310" providerId="LiveId" clId="{7952FB6B-E4B5-4CA9-B838-8CFA95871397}" dt="2023-11-02T22:36:22.262" v="71" actId="478"/>
+          <ac:spMkLst>
+            <pc:docMk/>
+            <pc:sldMk cId="3031865952" sldId="262"/>
+            <ac:spMk id="7" creationId="{ADFDE47A-8FD1-D65F-57F4-A2ACF3A07C3E}"/>
+          </ac:spMkLst>
+        </pc:spChg>
+        <pc:spChg chg="add del mod">
+          <ac:chgData name="Paul Ebbers" userId="68d1a23b9a453310" providerId="LiveId" clId="{7952FB6B-E4B5-4CA9-B838-8CFA95871397}" dt="2023-11-02T22:37:42.694" v="87" actId="478"/>
+          <ac:spMkLst>
+            <pc:docMk/>
+            <pc:sldMk cId="3031865952" sldId="262"/>
+            <ac:spMk id="8" creationId="{5B16A7B3-7F27-3A72-D027-3B9AD2C67211}"/>
+          </ac:spMkLst>
+        </pc:spChg>
+        <pc:spChg chg="add del mod">
+          <ac:chgData name="Paul Ebbers" userId="68d1a23b9a453310" providerId="LiveId" clId="{7952FB6B-E4B5-4CA9-B838-8CFA95871397}" dt="2023-11-02T22:37:42.694" v="87" actId="478"/>
+          <ac:spMkLst>
+            <pc:docMk/>
+            <pc:sldMk cId="3031865952" sldId="262"/>
+            <ac:spMk id="9" creationId="{58E6A173-1A02-C33D-BF28-6243BADB8529}"/>
+          </ac:spMkLst>
+        </pc:spChg>
+        <pc:spChg chg="add mod">
+          <ac:chgData name="Paul Ebbers" userId="68d1a23b9a453310" providerId="LiveId" clId="{7952FB6B-E4B5-4CA9-B838-8CFA95871397}" dt="2023-11-02T22:40:27.938" v="118" actId="2085"/>
+          <ac:spMkLst>
+            <pc:docMk/>
+            <pc:sldMk cId="3031865952" sldId="262"/>
+            <ac:spMk id="10" creationId="{B3AC8D0C-4721-B876-9CAA-6E052A119F31}"/>
+          </ac:spMkLst>
+        </pc:spChg>
+        <pc:spChg chg="add mod">
+          <ac:chgData name="Paul Ebbers" userId="68d1a23b9a453310" providerId="LiveId" clId="{7952FB6B-E4B5-4CA9-B838-8CFA95871397}" dt="2023-11-02T22:40:27.938" v="118" actId="2085"/>
+          <ac:spMkLst>
+            <pc:docMk/>
+            <pc:sldMk cId="3031865952" sldId="262"/>
+            <ac:spMk id="11" creationId="{1479C03F-B2EF-82AA-7D3D-B70000FB5FCA}"/>
+          </ac:spMkLst>
+        </pc:spChg>
+        <pc:spChg chg="add mod">
+          <ac:chgData name="Paul Ebbers" userId="68d1a23b9a453310" providerId="LiveId" clId="{7952FB6B-E4B5-4CA9-B838-8CFA95871397}" dt="2023-11-02T22:40:30.257" v="119" actId="2085"/>
+          <ac:spMkLst>
+            <pc:docMk/>
+            <pc:sldMk cId="3031865952" sldId="262"/>
+            <ac:spMk id="12" creationId="{FEA5DCD5-D124-5120-7FB4-275C30B94938}"/>
+          </ac:spMkLst>
+        </pc:spChg>
+        <pc:spChg chg="add mod">
+          <ac:chgData name="Paul Ebbers" userId="68d1a23b9a453310" providerId="LiveId" clId="{7952FB6B-E4B5-4CA9-B838-8CFA95871397}" dt="2023-11-02T22:40:30.257" v="119" actId="2085"/>
+          <ac:spMkLst>
+            <pc:docMk/>
+            <pc:sldMk cId="3031865952" sldId="262"/>
+            <ac:spMk id="13" creationId="{059A676B-F733-AA30-2998-7D4553C3EB3F}"/>
+          </ac:spMkLst>
+        </pc:spChg>
+        <pc:spChg chg="add mod">
+          <ac:chgData name="Paul Ebbers" userId="68d1a23b9a453310" providerId="LiveId" clId="{7952FB6B-E4B5-4CA9-B838-8CFA95871397}" dt="2023-11-02T22:40:32.946" v="120" actId="2085"/>
+          <ac:spMkLst>
+            <pc:docMk/>
+            <pc:sldMk cId="3031865952" sldId="262"/>
+            <ac:spMk id="14" creationId="{0250BE43-23CF-6094-AA8D-4BA9825D3D1A}"/>
+          </ac:spMkLst>
+        </pc:spChg>
+        <pc:spChg chg="add mod">
+          <ac:chgData name="Paul Ebbers" userId="68d1a23b9a453310" providerId="LiveId" clId="{7952FB6B-E4B5-4CA9-B838-8CFA95871397}" dt="2023-11-02T22:40:32.946" v="120" actId="2085"/>
+          <ac:spMkLst>
+            <pc:docMk/>
+            <pc:sldMk cId="3031865952" sldId="262"/>
+            <ac:spMk id="15" creationId="{581C5F47-30F1-6F2D-6A20-79A0F1ABBB37}"/>
+          </ac:spMkLst>
+        </pc:spChg>
+        <pc:spChg chg="add mod">
+          <ac:chgData name="Paul Ebbers" userId="68d1a23b9a453310" providerId="LiveId" clId="{7952FB6B-E4B5-4CA9-B838-8CFA95871397}" dt="2023-11-02T23:03:37.380" v="126" actId="1076"/>
+          <ac:spMkLst>
+            <pc:docMk/>
+            <pc:sldMk cId="3031865952" sldId="262"/>
+            <ac:spMk id="23" creationId="{AD2E90AD-7683-2FCA-5FD3-3827038D622B}"/>
+          </ac:spMkLst>
+        </pc:spChg>
+        <pc:spChg chg="add mod">
+          <ac:chgData name="Paul Ebbers" userId="68d1a23b9a453310" providerId="LiveId" clId="{7952FB6B-E4B5-4CA9-B838-8CFA95871397}" dt="2023-11-02T23:06:41.520" v="139" actId="20577"/>
+          <ac:spMkLst>
+            <pc:docMk/>
+            <pc:sldMk cId="3031865952" sldId="262"/>
+            <ac:spMk id="24" creationId="{4421FB89-72FF-E3B3-5DD1-813B466ED7DE}"/>
+          </ac:spMkLst>
+        </pc:spChg>
+        <pc:spChg chg="add mod">
+          <ac:chgData name="Paul Ebbers" userId="68d1a23b9a453310" providerId="LiveId" clId="{7952FB6B-E4B5-4CA9-B838-8CFA95871397}" dt="2023-11-02T23:10:39.751" v="146" actId="1076"/>
+          <ac:spMkLst>
+            <pc:docMk/>
+            <pc:sldMk cId="3031865952" sldId="262"/>
+            <ac:spMk id="27" creationId="{7DF2CB00-26CC-3201-9BFB-5BCDC760679B}"/>
+          </ac:spMkLst>
+        </pc:spChg>
+        <pc:spChg chg="add mod">
+          <ac:chgData name="Paul Ebbers" userId="68d1a23b9a453310" providerId="LiveId" clId="{7952FB6B-E4B5-4CA9-B838-8CFA95871397}" dt="2023-11-02T23:10:39.751" v="146" actId="1076"/>
+          <ac:spMkLst>
+            <pc:docMk/>
+            <pc:sldMk cId="3031865952" sldId="262"/>
+            <ac:spMk id="28" creationId="{FE521176-3E5D-B851-3254-10C4DE6495C2}"/>
+          </ac:spMkLst>
+        </pc:spChg>
+        <pc:grpChg chg="add mod">
+          <ac:chgData name="Paul Ebbers" userId="68d1a23b9a453310" providerId="LiveId" clId="{7952FB6B-E4B5-4CA9-B838-8CFA95871397}" dt="2023-11-02T22:40:17.942" v="116" actId="1076"/>
+          <ac:grpSpMkLst>
+            <pc:docMk/>
+            <pc:sldMk cId="3031865952" sldId="262"/>
+            <ac:grpSpMk id="16" creationId="{80B48CCE-F9E8-3689-2FA3-EEE368FCC27B}"/>
+          </ac:grpSpMkLst>
+        </pc:grpChg>
+        <pc:grpChg chg="add mod">
+          <ac:chgData name="Paul Ebbers" userId="68d1a23b9a453310" providerId="LiveId" clId="{7952FB6B-E4B5-4CA9-B838-8CFA95871397}" dt="2023-11-02T22:40:20.793" v="117" actId="1076"/>
+          <ac:grpSpMkLst>
+            <pc:docMk/>
+            <pc:sldMk cId="3031865952" sldId="262"/>
+            <ac:grpSpMk id="17" creationId="{2B77A6C7-71D8-6E1D-7046-B1CB88C75FC9}"/>
+          </ac:grpSpMkLst>
+        </pc:grpChg>
+        <pc:grpChg chg="add mod">
+          <ac:chgData name="Paul Ebbers" userId="68d1a23b9a453310" providerId="LiveId" clId="{7952FB6B-E4B5-4CA9-B838-8CFA95871397}" dt="2023-11-02T22:40:04.521" v="115" actId="164"/>
+          <ac:grpSpMkLst>
+            <pc:docMk/>
+            <pc:sldMk cId="3031865952" sldId="262"/>
+            <ac:grpSpMk id="18" creationId="{B947BA91-C60A-1ACF-6283-D84B424D1084}"/>
+          </ac:grpSpMkLst>
+        </pc:grpChg>
+        <pc:picChg chg="add mod">
+          <ac:chgData name="Paul Ebbers" userId="68d1a23b9a453310" providerId="LiveId" clId="{7952FB6B-E4B5-4CA9-B838-8CFA95871397}" dt="2023-11-02T22:40:27.938" v="118" actId="2085"/>
+          <ac:picMkLst>
+            <pc:docMk/>
+            <pc:sldMk cId="3031865952" sldId="262"/>
+            <ac:picMk id="2" creationId="{EDA83522-7233-A107-563D-8A3DC55F9D40}"/>
+          </ac:picMkLst>
+        </pc:picChg>
+        <pc:picChg chg="add mod">
+          <ac:chgData name="Paul Ebbers" userId="68d1a23b9a453310" providerId="LiveId" clId="{7952FB6B-E4B5-4CA9-B838-8CFA95871397}" dt="2023-11-02T22:40:30.257" v="119" actId="2085"/>
+          <ac:picMkLst>
+            <pc:docMk/>
+            <pc:sldMk cId="3031865952" sldId="262"/>
+            <ac:picMk id="3" creationId="{CF75CBCB-4025-FBFC-0DF4-297FBDB67A47}"/>
+          </ac:picMkLst>
+        </pc:picChg>
+        <pc:picChg chg="add mod">
+          <ac:chgData name="Paul Ebbers" userId="68d1a23b9a453310" providerId="LiveId" clId="{7952FB6B-E4B5-4CA9-B838-8CFA95871397}" dt="2023-11-02T22:40:32.946" v="120" actId="2085"/>
+          <ac:picMkLst>
+            <pc:docMk/>
+            <pc:sldMk cId="3031865952" sldId="262"/>
+            <ac:picMk id="4" creationId="{2F11F813-CF4C-8938-26D4-FA0EB942C982}"/>
+          </ac:picMkLst>
+        </pc:picChg>
+        <pc:picChg chg="del">
+          <ac:chgData name="Paul Ebbers" userId="68d1a23b9a453310" providerId="LiveId" clId="{7952FB6B-E4B5-4CA9-B838-8CFA95871397}" dt="2023-11-02T22:36:22.262" v="71" actId="478"/>
+          <ac:picMkLst>
+            <pc:docMk/>
+            <pc:sldMk cId="3031865952" sldId="262"/>
+            <ac:picMk id="5" creationId="{600DAD0C-D7B2-A885-BD8F-D2B9D5C05578}"/>
+          </ac:picMkLst>
+        </pc:picChg>
+        <pc:picChg chg="add mod">
+          <ac:chgData name="Paul Ebbers" userId="68d1a23b9a453310" providerId="LiveId" clId="{7952FB6B-E4B5-4CA9-B838-8CFA95871397}" dt="2023-11-02T23:10:17.168" v="145" actId="1076"/>
+          <ac:picMkLst>
+            <pc:docMk/>
+            <pc:sldMk cId="3031865952" sldId="262"/>
+            <ac:picMk id="20" creationId="{771EA4F5-EFE8-4630-582F-A8EB45053E00}"/>
+          </ac:picMkLst>
+        </pc:picChg>
+        <pc:picChg chg="add del">
+          <ac:chgData name="Paul Ebbers" userId="68d1a23b9a453310" providerId="LiveId" clId="{7952FB6B-E4B5-4CA9-B838-8CFA95871397}" dt="2023-11-02T23:03:26.754" v="124" actId="22"/>
+          <ac:picMkLst>
+            <pc:docMk/>
+            <pc:sldMk cId="3031865952" sldId="262"/>
+            <ac:picMk id="22" creationId="{61F90138-8C59-CCE8-4EAD-1B01E519095E}"/>
+          </ac:picMkLst>
+        </pc:picChg>
+        <pc:picChg chg="add mod modCrop">
+          <ac:chgData name="Paul Ebbers" userId="68d1a23b9a453310" providerId="LiveId" clId="{7952FB6B-E4B5-4CA9-B838-8CFA95871397}" dt="2023-11-02T23:10:10.362" v="142" actId="732"/>
+          <ac:picMkLst>
+            <pc:docMk/>
+            <pc:sldMk cId="3031865952" sldId="262"/>
+            <ac:picMk id="26" creationId="{E7ECCD49-786C-39E2-ABDB-6AE69B40E730}"/>
+          </ac:picMkLst>
+        </pc:picChg>
       </pc:sldChg>
     </pc:docChg>
   </pc:docChgLst>
@@ -3807,6 +4252,1319 @@
 </p:sld>
 </file>
 
+<file path=ppt/slides/slide3.xml><?xml version="1.0" encoding="utf-8"?>
+<p:sld xmlns:a="http://schemas.openxmlformats.org/drawingml/2006/main" xmlns:r="http://schemas.openxmlformats.org/officeDocument/2006/relationships" xmlns:p="http://schemas.openxmlformats.org/presentationml/2006/main">
+  <p:cSld>
+    <p:spTree>
+      <p:nvGrpSpPr>
+        <p:cNvPr id="1" name=""/>
+        <p:cNvGrpSpPr/>
+        <p:nvPr/>
+      </p:nvGrpSpPr>
+      <p:grpSpPr>
+        <a:xfrm>
+          <a:off x="0" y="0"/>
+          <a:ext cx="0" cy="0"/>
+          <a:chOff x="0" y="0"/>
+          <a:chExt cx="0" cy="0"/>
+        </a:xfrm>
+      </p:grpSpPr>
+      <p:pic>
+        <p:nvPicPr>
+          <p:cNvPr id="7" name="Picture 6">
+            <a:extLst>
+              <a:ext uri="{FF2B5EF4-FFF2-40B4-BE49-F238E27FC236}">
+                <a16:creationId xmlns:a16="http://schemas.microsoft.com/office/drawing/2014/main" id="{82F610C1-8AC9-018E-0629-8E2DA180132D}"/>
+              </a:ext>
+            </a:extLst>
+          </p:cNvPr>
+          <p:cNvPicPr>
+            <a:picLocks noChangeAspect="1"/>
+          </p:cNvPicPr>
+          <p:nvPr/>
+        </p:nvPicPr>
+        <p:blipFill>
+          <a:blip r:embed="rId2"/>
+          <a:stretch>
+            <a:fillRect/>
+          </a:stretch>
+        </p:blipFill>
+        <p:spPr>
+          <a:xfrm>
+            <a:off x="2496133" y="536082"/>
+            <a:ext cx="3844161" cy="5651291"/>
+          </a:xfrm>
+          <a:prstGeom prst="rect">
+            <a:avLst/>
+          </a:prstGeom>
+        </p:spPr>
+      </p:pic>
+      <p:sp>
+        <p:nvSpPr>
+          <p:cNvPr id="24" name="TextBox 23">
+            <a:extLst>
+              <a:ext uri="{FF2B5EF4-FFF2-40B4-BE49-F238E27FC236}">
+                <a16:creationId xmlns:a16="http://schemas.microsoft.com/office/drawing/2014/main" id="{A8919692-C2FF-3153-25FC-A8A3E8C21B41}"/>
+              </a:ext>
+            </a:extLst>
+          </p:cNvPr>
+          <p:cNvSpPr txBox="1"/>
+          <p:nvPr/>
+        </p:nvSpPr>
+        <p:spPr>
+          <a:xfrm>
+            <a:off x="5538101" y="1585420"/>
+            <a:ext cx="282450" cy="246221"/>
+          </a:xfrm>
+          <a:prstGeom prst="rect">
+            <a:avLst/>
+          </a:prstGeom>
+          <a:noFill/>
+        </p:spPr>
+        <p:txBody>
+          <a:bodyPr wrap="none" rtlCol="0">
+            <a:spAutoFit/>
+          </a:bodyPr>
+          <a:lstStyle/>
+          <a:p>
+            <a:r>
+              <a:rPr lang="en-GB" sz="1000" dirty="0">
+                <a:solidFill>
+                  <a:srgbClr val="FF0000"/>
+                </a:solidFill>
+              </a:rPr>
+              <a:t>1.</a:t>
+            </a:r>
+            <a:endParaRPr lang="en-NL" sz="1000" dirty="0">
+              <a:solidFill>
+                <a:srgbClr val="FF0000"/>
+              </a:solidFill>
+            </a:endParaRPr>
+          </a:p>
+        </p:txBody>
+      </p:sp>
+      <p:sp>
+        <p:nvSpPr>
+          <p:cNvPr id="25" name="TextBox 24">
+            <a:extLst>
+              <a:ext uri="{FF2B5EF4-FFF2-40B4-BE49-F238E27FC236}">
+                <a16:creationId xmlns:a16="http://schemas.microsoft.com/office/drawing/2014/main" id="{7A37F27E-4223-F46E-09AB-3749E7334A83}"/>
+              </a:ext>
+            </a:extLst>
+          </p:cNvPr>
+          <p:cNvSpPr txBox="1"/>
+          <p:nvPr/>
+        </p:nvSpPr>
+        <p:spPr>
+          <a:xfrm>
+            <a:off x="5538101" y="2880979"/>
+            <a:ext cx="282450" cy="246221"/>
+          </a:xfrm>
+          <a:prstGeom prst="rect">
+            <a:avLst/>
+          </a:prstGeom>
+          <a:noFill/>
+        </p:spPr>
+        <p:txBody>
+          <a:bodyPr wrap="none" rtlCol="0">
+            <a:spAutoFit/>
+          </a:bodyPr>
+          <a:lstStyle/>
+          <a:p>
+            <a:r>
+              <a:rPr lang="en-GB" sz="1000" dirty="0">
+                <a:solidFill>
+                  <a:srgbClr val="FF0000"/>
+                </a:solidFill>
+              </a:rPr>
+              <a:t>2.</a:t>
+            </a:r>
+            <a:endParaRPr lang="en-NL" sz="1000" dirty="0">
+              <a:solidFill>
+                <a:srgbClr val="FF0000"/>
+              </a:solidFill>
+            </a:endParaRPr>
+          </a:p>
+        </p:txBody>
+      </p:sp>
+      <p:sp>
+        <p:nvSpPr>
+          <p:cNvPr id="26" name="TextBox 25">
+            <a:extLst>
+              <a:ext uri="{FF2B5EF4-FFF2-40B4-BE49-F238E27FC236}">
+                <a16:creationId xmlns:a16="http://schemas.microsoft.com/office/drawing/2014/main" id="{C6D3B01D-973E-5342-356B-41B31A34F7F8}"/>
+              </a:ext>
+            </a:extLst>
+          </p:cNvPr>
+          <p:cNvSpPr txBox="1"/>
+          <p:nvPr/>
+        </p:nvSpPr>
+        <p:spPr>
+          <a:xfrm>
+            <a:off x="4135763" y="2080204"/>
+            <a:ext cx="343364" cy="246221"/>
+          </a:xfrm>
+          <a:prstGeom prst="rect">
+            <a:avLst/>
+          </a:prstGeom>
+          <a:noFill/>
+        </p:spPr>
+        <p:txBody>
+          <a:bodyPr wrap="none" rtlCol="0">
+            <a:spAutoFit/>
+          </a:bodyPr>
+          <a:lstStyle/>
+          <a:p>
+            <a:r>
+              <a:rPr lang="en-GB" sz="1000" dirty="0">
+                <a:solidFill>
+                  <a:srgbClr val="FF0000"/>
+                </a:solidFill>
+              </a:rPr>
+              <a:t>1a.</a:t>
+            </a:r>
+            <a:endParaRPr lang="en-NL" sz="1000" dirty="0">
+              <a:solidFill>
+                <a:srgbClr val="FF0000"/>
+              </a:solidFill>
+            </a:endParaRPr>
+          </a:p>
+        </p:txBody>
+      </p:sp>
+    </p:spTree>
+    <p:extLst>
+      <p:ext uri="{BB962C8B-B14F-4D97-AF65-F5344CB8AC3E}">
+        <p14:creationId xmlns:p14="http://schemas.microsoft.com/office/powerpoint/2010/main" val="2299650287"/>
+      </p:ext>
+    </p:extLst>
+  </p:cSld>
+  <p:clrMapOvr>
+    <a:masterClrMapping/>
+  </p:clrMapOvr>
+</p:sld>
+</file>
+
+<file path=ppt/slides/slide4.xml><?xml version="1.0" encoding="utf-8"?>
+<p:sld xmlns:a="http://schemas.openxmlformats.org/drawingml/2006/main" xmlns:r="http://schemas.openxmlformats.org/officeDocument/2006/relationships" xmlns:p="http://schemas.openxmlformats.org/presentationml/2006/main">
+  <p:cSld>
+    <p:spTree>
+      <p:nvGrpSpPr>
+        <p:cNvPr id="1" name=""/>
+        <p:cNvGrpSpPr/>
+        <p:nvPr/>
+      </p:nvGrpSpPr>
+      <p:grpSpPr>
+        <a:xfrm>
+          <a:off x="0" y="0"/>
+          <a:ext cx="0" cy="0"/>
+          <a:chOff x="0" y="0"/>
+          <a:chExt cx="0" cy="0"/>
+        </a:xfrm>
+      </p:grpSpPr>
+      <p:pic>
+        <p:nvPicPr>
+          <p:cNvPr id="3" name="Picture 2">
+            <a:extLst>
+              <a:ext uri="{FF2B5EF4-FFF2-40B4-BE49-F238E27FC236}">
+                <a16:creationId xmlns:a16="http://schemas.microsoft.com/office/drawing/2014/main" id="{B06BAB10-18EF-2F15-BC35-099247EF1264}"/>
+              </a:ext>
+            </a:extLst>
+          </p:cNvPr>
+          <p:cNvPicPr>
+            <a:picLocks noChangeAspect="1"/>
+          </p:cNvPicPr>
+          <p:nvPr/>
+        </p:nvPicPr>
+        <p:blipFill>
+          <a:blip r:embed="rId2"/>
+          <a:stretch>
+            <a:fillRect/>
+          </a:stretch>
+        </p:blipFill>
+        <p:spPr>
+          <a:xfrm>
+            <a:off x="1690300" y="668205"/>
+            <a:ext cx="3847801" cy="5651291"/>
+          </a:xfrm>
+          <a:prstGeom prst="rect">
+            <a:avLst/>
+          </a:prstGeom>
+        </p:spPr>
+      </p:pic>
+      <p:sp>
+        <p:nvSpPr>
+          <p:cNvPr id="24" name="TextBox 23">
+            <a:extLst>
+              <a:ext uri="{FF2B5EF4-FFF2-40B4-BE49-F238E27FC236}">
+                <a16:creationId xmlns:a16="http://schemas.microsoft.com/office/drawing/2014/main" id="{A8919692-C2FF-3153-25FC-A8A3E8C21B41}"/>
+              </a:ext>
+            </a:extLst>
+          </p:cNvPr>
+          <p:cNvSpPr txBox="1"/>
+          <p:nvPr/>
+        </p:nvSpPr>
+        <p:spPr>
+          <a:xfrm>
+            <a:off x="3670391" y="1287105"/>
+            <a:ext cx="282450" cy="246221"/>
+          </a:xfrm>
+          <a:prstGeom prst="rect">
+            <a:avLst/>
+          </a:prstGeom>
+          <a:noFill/>
+        </p:spPr>
+        <p:txBody>
+          <a:bodyPr wrap="none" rtlCol="0">
+            <a:spAutoFit/>
+          </a:bodyPr>
+          <a:lstStyle/>
+          <a:p>
+            <a:r>
+              <a:rPr lang="en-GB" sz="1000" dirty="0">
+                <a:solidFill>
+                  <a:srgbClr val="FF0000"/>
+                </a:solidFill>
+              </a:rPr>
+              <a:t>1.</a:t>
+            </a:r>
+            <a:endParaRPr lang="en-NL" sz="1000" dirty="0">
+              <a:solidFill>
+                <a:srgbClr val="FF0000"/>
+              </a:solidFill>
+            </a:endParaRPr>
+          </a:p>
+        </p:txBody>
+      </p:sp>
+      <p:sp>
+        <p:nvSpPr>
+          <p:cNvPr id="25" name="TextBox 24">
+            <a:extLst>
+              <a:ext uri="{FF2B5EF4-FFF2-40B4-BE49-F238E27FC236}">
+                <a16:creationId xmlns:a16="http://schemas.microsoft.com/office/drawing/2014/main" id="{7A37F27E-4223-F46E-09AB-3749E7334A83}"/>
+              </a:ext>
+            </a:extLst>
+          </p:cNvPr>
+          <p:cNvSpPr txBox="1"/>
+          <p:nvPr/>
+        </p:nvSpPr>
+        <p:spPr>
+          <a:xfrm>
+            <a:off x="3274798" y="1486682"/>
+            <a:ext cx="282450" cy="246221"/>
+          </a:xfrm>
+          <a:prstGeom prst="rect">
+            <a:avLst/>
+          </a:prstGeom>
+          <a:noFill/>
+        </p:spPr>
+        <p:txBody>
+          <a:bodyPr wrap="none" rtlCol="0">
+            <a:spAutoFit/>
+          </a:bodyPr>
+          <a:lstStyle/>
+          <a:p>
+            <a:r>
+              <a:rPr lang="en-GB" sz="1000" dirty="0">
+                <a:solidFill>
+                  <a:srgbClr val="FF0000"/>
+                </a:solidFill>
+              </a:rPr>
+              <a:t>2.</a:t>
+            </a:r>
+            <a:endParaRPr lang="en-NL" sz="1000" dirty="0">
+              <a:solidFill>
+                <a:srgbClr val="FF0000"/>
+              </a:solidFill>
+            </a:endParaRPr>
+          </a:p>
+        </p:txBody>
+      </p:sp>
+    </p:spTree>
+    <p:extLst>
+      <p:ext uri="{BB962C8B-B14F-4D97-AF65-F5344CB8AC3E}">
+        <p14:creationId xmlns:p14="http://schemas.microsoft.com/office/powerpoint/2010/main" val="3500793818"/>
+      </p:ext>
+    </p:extLst>
+  </p:cSld>
+  <p:clrMapOvr>
+    <a:masterClrMapping/>
+  </p:clrMapOvr>
+</p:sld>
+</file>
+
+<file path=ppt/slides/slide5.xml><?xml version="1.0" encoding="utf-8"?>
+<p:sld xmlns:a="http://schemas.openxmlformats.org/drawingml/2006/main" xmlns:r="http://schemas.openxmlformats.org/officeDocument/2006/relationships" xmlns:p="http://schemas.openxmlformats.org/presentationml/2006/main">
+  <p:cSld>
+    <p:spTree>
+      <p:nvGrpSpPr>
+        <p:cNvPr id="1" name=""/>
+        <p:cNvGrpSpPr/>
+        <p:nvPr/>
+      </p:nvGrpSpPr>
+      <p:grpSpPr>
+        <a:xfrm>
+          <a:off x="0" y="0"/>
+          <a:ext cx="0" cy="0"/>
+          <a:chOff x="0" y="0"/>
+          <a:chExt cx="0" cy="0"/>
+        </a:xfrm>
+      </p:grpSpPr>
+      <p:pic>
+        <p:nvPicPr>
+          <p:cNvPr id="5" name="Picture 4">
+            <a:extLst>
+              <a:ext uri="{FF2B5EF4-FFF2-40B4-BE49-F238E27FC236}">
+                <a16:creationId xmlns:a16="http://schemas.microsoft.com/office/drawing/2014/main" id="{85B03660-EA31-DF53-2EBF-F9627C3F5BED}"/>
+              </a:ext>
+            </a:extLst>
+          </p:cNvPr>
+          <p:cNvPicPr>
+            <a:picLocks noChangeAspect="1"/>
+          </p:cNvPicPr>
+          <p:nvPr/>
+        </p:nvPicPr>
+        <p:blipFill>
+          <a:blip r:embed="rId2"/>
+          <a:stretch>
+            <a:fillRect/>
+          </a:stretch>
+        </p:blipFill>
+        <p:spPr>
+          <a:xfrm>
+            <a:off x="2054568" y="801973"/>
+            <a:ext cx="3671313" cy="5651290"/>
+          </a:xfrm>
+          <a:prstGeom prst="rect">
+            <a:avLst/>
+          </a:prstGeom>
+        </p:spPr>
+      </p:pic>
+      <p:sp>
+        <p:nvSpPr>
+          <p:cNvPr id="43" name="TextBox 42">
+            <a:extLst>
+              <a:ext uri="{FF2B5EF4-FFF2-40B4-BE49-F238E27FC236}">
+                <a16:creationId xmlns:a16="http://schemas.microsoft.com/office/drawing/2014/main" id="{970392BD-5D1C-C27E-C1CB-78ED716A716C}"/>
+              </a:ext>
+            </a:extLst>
+          </p:cNvPr>
+          <p:cNvSpPr txBox="1"/>
+          <p:nvPr/>
+        </p:nvSpPr>
+        <p:spPr>
+          <a:xfrm>
+            <a:off x="4830116" y="3874205"/>
+            <a:ext cx="282450" cy="246221"/>
+          </a:xfrm>
+          <a:prstGeom prst="rect">
+            <a:avLst/>
+          </a:prstGeom>
+          <a:noFill/>
+        </p:spPr>
+        <p:txBody>
+          <a:bodyPr wrap="none" rtlCol="0">
+            <a:spAutoFit/>
+          </a:bodyPr>
+          <a:lstStyle/>
+          <a:p>
+            <a:r>
+              <a:rPr lang="en-GB" sz="1000" dirty="0">
+                <a:solidFill>
+                  <a:srgbClr val="FF0000"/>
+                </a:solidFill>
+              </a:rPr>
+              <a:t>1.</a:t>
+            </a:r>
+            <a:endParaRPr lang="en-NL" sz="1000" dirty="0">
+              <a:solidFill>
+                <a:srgbClr val="FF0000"/>
+              </a:solidFill>
+            </a:endParaRPr>
+          </a:p>
+        </p:txBody>
+      </p:sp>
+    </p:spTree>
+    <p:extLst>
+      <p:ext uri="{BB962C8B-B14F-4D97-AF65-F5344CB8AC3E}">
+        <p14:creationId xmlns:p14="http://schemas.microsoft.com/office/powerpoint/2010/main" val="3623053889"/>
+      </p:ext>
+    </p:extLst>
+  </p:cSld>
+  <p:clrMapOvr>
+    <a:masterClrMapping/>
+  </p:clrMapOvr>
+</p:sld>
+</file>
+
+<file path=ppt/slides/slide6.xml><?xml version="1.0" encoding="utf-8"?>
+<p:sld xmlns:a="http://schemas.openxmlformats.org/drawingml/2006/main" xmlns:r="http://schemas.openxmlformats.org/officeDocument/2006/relationships" xmlns:p="http://schemas.openxmlformats.org/presentationml/2006/main">
+  <p:cSld>
+    <p:spTree>
+      <p:nvGrpSpPr>
+        <p:cNvPr id="1" name=""/>
+        <p:cNvGrpSpPr/>
+        <p:nvPr/>
+      </p:nvGrpSpPr>
+      <p:grpSpPr>
+        <a:xfrm>
+          <a:off x="0" y="0"/>
+          <a:ext cx="0" cy="0"/>
+          <a:chOff x="0" y="0"/>
+          <a:chExt cx="0" cy="0"/>
+        </a:xfrm>
+      </p:grpSpPr>
+      <p:pic>
+        <p:nvPicPr>
+          <p:cNvPr id="5" name="Picture 4">
+            <a:extLst>
+              <a:ext uri="{FF2B5EF4-FFF2-40B4-BE49-F238E27FC236}">
+                <a16:creationId xmlns:a16="http://schemas.microsoft.com/office/drawing/2014/main" id="{600DAD0C-D7B2-A885-BD8F-D2B9D5C05578}"/>
+              </a:ext>
+            </a:extLst>
+          </p:cNvPr>
+          <p:cNvPicPr>
+            <a:picLocks noChangeAspect="1"/>
+          </p:cNvPicPr>
+          <p:nvPr/>
+        </p:nvPicPr>
+        <p:blipFill>
+          <a:blip r:embed="rId2"/>
+          <a:stretch>
+            <a:fillRect/>
+          </a:stretch>
+        </p:blipFill>
+        <p:spPr>
+          <a:xfrm>
+            <a:off x="1768591" y="1273934"/>
+            <a:ext cx="5663728" cy="1536722"/>
+          </a:xfrm>
+          <a:prstGeom prst="rect">
+            <a:avLst/>
+          </a:prstGeom>
+        </p:spPr>
+      </p:pic>
+      <p:sp>
+        <p:nvSpPr>
+          <p:cNvPr id="6" name="TextBox 5">
+            <a:extLst>
+              <a:ext uri="{FF2B5EF4-FFF2-40B4-BE49-F238E27FC236}">
+                <a16:creationId xmlns:a16="http://schemas.microsoft.com/office/drawing/2014/main" id="{AD266914-7EAC-F129-EC58-F2C044ABE096}"/>
+              </a:ext>
+            </a:extLst>
+          </p:cNvPr>
+          <p:cNvSpPr txBox="1"/>
+          <p:nvPr/>
+        </p:nvSpPr>
+        <p:spPr>
+          <a:xfrm>
+            <a:off x="1744789" y="2037909"/>
+            <a:ext cx="282450" cy="246221"/>
+          </a:xfrm>
+          <a:prstGeom prst="rect">
+            <a:avLst/>
+          </a:prstGeom>
+          <a:noFill/>
+        </p:spPr>
+        <p:txBody>
+          <a:bodyPr wrap="none" rtlCol="0">
+            <a:spAutoFit/>
+          </a:bodyPr>
+          <a:lstStyle/>
+          <a:p>
+            <a:r>
+              <a:rPr lang="en-GB" sz="1000" dirty="0">
+                <a:solidFill>
+                  <a:srgbClr val="FF0000"/>
+                </a:solidFill>
+              </a:rPr>
+              <a:t>1.</a:t>
+            </a:r>
+            <a:endParaRPr lang="en-NL" sz="1000" dirty="0">
+              <a:solidFill>
+                <a:srgbClr val="FF0000"/>
+              </a:solidFill>
+            </a:endParaRPr>
+          </a:p>
+        </p:txBody>
+      </p:sp>
+      <p:sp>
+        <p:nvSpPr>
+          <p:cNvPr id="7" name="TextBox 6">
+            <a:extLst>
+              <a:ext uri="{FF2B5EF4-FFF2-40B4-BE49-F238E27FC236}">
+                <a16:creationId xmlns:a16="http://schemas.microsoft.com/office/drawing/2014/main" id="{ADFDE47A-8FD1-D65F-57F4-A2ACF3A07C3E}"/>
+              </a:ext>
+            </a:extLst>
+          </p:cNvPr>
+          <p:cNvSpPr txBox="1"/>
+          <p:nvPr/>
+        </p:nvSpPr>
+        <p:spPr>
+          <a:xfrm>
+            <a:off x="2235785" y="2030414"/>
+            <a:ext cx="282450" cy="246221"/>
+          </a:xfrm>
+          <a:prstGeom prst="rect">
+            <a:avLst/>
+          </a:prstGeom>
+          <a:noFill/>
+        </p:spPr>
+        <p:txBody>
+          <a:bodyPr wrap="none" rtlCol="0">
+            <a:spAutoFit/>
+          </a:bodyPr>
+          <a:lstStyle/>
+          <a:p>
+            <a:r>
+              <a:rPr lang="en-GB" sz="1000" dirty="0">
+                <a:solidFill>
+                  <a:srgbClr val="FF0000"/>
+                </a:solidFill>
+              </a:rPr>
+              <a:t>2.</a:t>
+            </a:r>
+            <a:endParaRPr lang="en-NL" sz="1000" dirty="0">
+              <a:solidFill>
+                <a:srgbClr val="FF0000"/>
+              </a:solidFill>
+            </a:endParaRPr>
+          </a:p>
+        </p:txBody>
+      </p:sp>
+    </p:spTree>
+    <p:extLst>
+      <p:ext uri="{BB962C8B-B14F-4D97-AF65-F5344CB8AC3E}">
+        <p14:creationId xmlns:p14="http://schemas.microsoft.com/office/powerpoint/2010/main" val="945030047"/>
+      </p:ext>
+    </p:extLst>
+  </p:cSld>
+  <p:clrMapOvr>
+    <a:masterClrMapping/>
+  </p:clrMapOvr>
+</p:sld>
+</file>
+
+<file path=ppt/slides/slide7.xml><?xml version="1.0" encoding="utf-8"?>
+<p:sld xmlns:a="http://schemas.openxmlformats.org/drawingml/2006/main" xmlns:r="http://schemas.openxmlformats.org/officeDocument/2006/relationships" xmlns:p="http://schemas.openxmlformats.org/presentationml/2006/main">
+  <p:cSld>
+    <p:spTree>
+      <p:nvGrpSpPr>
+        <p:cNvPr id="1" name=""/>
+        <p:cNvGrpSpPr/>
+        <p:nvPr/>
+      </p:nvGrpSpPr>
+      <p:grpSpPr>
+        <a:xfrm>
+          <a:off x="0" y="0"/>
+          <a:ext cx="0" cy="0"/>
+          <a:chOff x="0" y="0"/>
+          <a:chExt cx="0" cy="0"/>
+        </a:xfrm>
+      </p:grpSpPr>
+      <p:grpSp>
+        <p:nvGrpSpPr>
+          <p:cNvPr id="16" name="Group 15">
+            <a:extLst>
+              <a:ext uri="{FF2B5EF4-FFF2-40B4-BE49-F238E27FC236}">
+                <a16:creationId xmlns:a16="http://schemas.microsoft.com/office/drawing/2014/main" id="{80B48CCE-F9E8-3689-2FA3-EEE368FCC27B}"/>
+              </a:ext>
+            </a:extLst>
+          </p:cNvPr>
+          <p:cNvGrpSpPr/>
+          <p:nvPr/>
+        </p:nvGrpSpPr>
+        <p:grpSpPr>
+          <a:xfrm>
+            <a:off x="1698637" y="617340"/>
+            <a:ext cx="2305372" cy="1228896"/>
+            <a:chOff x="1708364" y="1110208"/>
+            <a:chExt cx="2305372" cy="1228896"/>
+          </a:xfrm>
+        </p:grpSpPr>
+        <p:pic>
+          <p:nvPicPr>
+            <p:cNvPr id="2" name="Picture 1">
+              <a:extLst>
+                <a:ext uri="{FF2B5EF4-FFF2-40B4-BE49-F238E27FC236}">
+                  <a16:creationId xmlns:a16="http://schemas.microsoft.com/office/drawing/2014/main" id="{EDA83522-7233-A107-563D-8A3DC55F9D40}"/>
+                </a:ext>
+              </a:extLst>
+            </p:cNvPr>
+            <p:cNvPicPr>
+              <a:picLocks noChangeAspect="1"/>
+            </p:cNvPicPr>
+            <p:nvPr/>
+          </p:nvPicPr>
+          <p:blipFill>
+            <a:blip r:embed="rId2"/>
+            <a:stretch>
+              <a:fillRect/>
+            </a:stretch>
+          </p:blipFill>
+          <p:spPr>
+            <a:xfrm>
+              <a:off x="1708364" y="1110208"/>
+              <a:ext cx="2305372" cy="1228896"/>
+            </a:xfrm>
+            <a:prstGeom prst="rect">
+              <a:avLst/>
+            </a:prstGeom>
+            <a:ln>
+              <a:noFill/>
+            </a:ln>
+          </p:spPr>
+        </p:pic>
+        <p:sp>
+          <p:nvSpPr>
+            <p:cNvPr id="10" name="TextBox 9">
+              <a:extLst>
+                <a:ext uri="{FF2B5EF4-FFF2-40B4-BE49-F238E27FC236}">
+                  <a16:creationId xmlns:a16="http://schemas.microsoft.com/office/drawing/2014/main" id="{B3AC8D0C-4721-B876-9CAA-6E052A119F31}"/>
+                </a:ext>
+              </a:extLst>
+            </p:cNvPr>
+            <p:cNvSpPr txBox="1"/>
+            <p:nvPr/>
+          </p:nvSpPr>
+          <p:spPr>
+            <a:xfrm>
+              <a:off x="3416075" y="1615537"/>
+              <a:ext cx="282450" cy="246221"/>
+            </a:xfrm>
+            <a:prstGeom prst="rect">
+              <a:avLst/>
+            </a:prstGeom>
+            <a:noFill/>
+            <a:ln>
+              <a:noFill/>
+            </a:ln>
+          </p:spPr>
+          <p:txBody>
+            <a:bodyPr wrap="none" rtlCol="0">
+              <a:spAutoFit/>
+            </a:bodyPr>
+            <a:lstStyle/>
+            <a:p>
+              <a:r>
+                <a:rPr lang="en-GB" sz="1000" dirty="0">
+                  <a:solidFill>
+                    <a:srgbClr val="FF0000"/>
+                  </a:solidFill>
+                </a:rPr>
+                <a:t>2.</a:t>
+              </a:r>
+              <a:endParaRPr lang="en-NL" sz="1000" dirty="0">
+                <a:solidFill>
+                  <a:srgbClr val="FF0000"/>
+                </a:solidFill>
+              </a:endParaRPr>
+            </a:p>
+          </p:txBody>
+        </p:sp>
+        <p:sp>
+          <p:nvSpPr>
+            <p:cNvPr id="11" name="TextBox 10">
+              <a:extLst>
+                <a:ext uri="{FF2B5EF4-FFF2-40B4-BE49-F238E27FC236}">
+                  <a16:creationId xmlns:a16="http://schemas.microsoft.com/office/drawing/2014/main" id="{1479C03F-B2EF-82AA-7D3D-B70000FB5FCA}"/>
+                </a:ext>
+              </a:extLst>
+            </p:cNvPr>
+            <p:cNvSpPr txBox="1"/>
+            <p:nvPr/>
+          </p:nvSpPr>
+          <p:spPr>
+            <a:xfrm>
+              <a:off x="3010756" y="1411256"/>
+              <a:ext cx="282450" cy="246221"/>
+            </a:xfrm>
+            <a:prstGeom prst="rect">
+              <a:avLst/>
+            </a:prstGeom>
+            <a:noFill/>
+            <a:ln>
+              <a:noFill/>
+            </a:ln>
+          </p:spPr>
+          <p:txBody>
+            <a:bodyPr wrap="none" rtlCol="0">
+              <a:spAutoFit/>
+            </a:bodyPr>
+            <a:lstStyle/>
+            <a:p>
+              <a:r>
+                <a:rPr lang="en-GB" sz="1000" dirty="0">
+                  <a:solidFill>
+                    <a:srgbClr val="FF0000"/>
+                  </a:solidFill>
+                </a:rPr>
+                <a:t>1.</a:t>
+              </a:r>
+              <a:endParaRPr lang="en-NL" sz="1000" dirty="0">
+                <a:solidFill>
+                  <a:srgbClr val="FF0000"/>
+                </a:solidFill>
+              </a:endParaRPr>
+            </a:p>
+          </p:txBody>
+        </p:sp>
+      </p:grpSp>
+      <p:grpSp>
+        <p:nvGrpSpPr>
+          <p:cNvPr id="17" name="Group 16">
+            <a:extLst>
+              <a:ext uri="{FF2B5EF4-FFF2-40B4-BE49-F238E27FC236}">
+                <a16:creationId xmlns:a16="http://schemas.microsoft.com/office/drawing/2014/main" id="{2B77A6C7-71D8-6E1D-7046-B1CB88C75FC9}"/>
+              </a:ext>
+            </a:extLst>
+          </p:cNvPr>
+          <p:cNvGrpSpPr/>
+          <p:nvPr/>
+        </p:nvGrpSpPr>
+        <p:grpSpPr>
+          <a:xfrm>
+            <a:off x="1698637" y="2085496"/>
+            <a:ext cx="3809230" cy="1257592"/>
+            <a:chOff x="1698637" y="2324756"/>
+            <a:chExt cx="3809230" cy="1257592"/>
+          </a:xfrm>
+        </p:grpSpPr>
+        <p:pic>
+          <p:nvPicPr>
+            <p:cNvPr id="3" name="Picture 2">
+              <a:extLst>
+                <a:ext uri="{FF2B5EF4-FFF2-40B4-BE49-F238E27FC236}">
+                  <a16:creationId xmlns:a16="http://schemas.microsoft.com/office/drawing/2014/main" id="{CF75CBCB-4025-FBFC-0DF4-297FBDB67A47}"/>
+                </a:ext>
+              </a:extLst>
+            </p:cNvPr>
+            <p:cNvPicPr>
+              <a:picLocks noChangeAspect="1"/>
+            </p:cNvPicPr>
+            <p:nvPr/>
+          </p:nvPicPr>
+          <p:blipFill>
+            <a:blip r:embed="rId3"/>
+            <a:stretch>
+              <a:fillRect/>
+            </a:stretch>
+          </p:blipFill>
+          <p:spPr>
+            <a:xfrm>
+              <a:off x="1698637" y="2324756"/>
+              <a:ext cx="3809230" cy="1257592"/>
+            </a:xfrm>
+            <a:prstGeom prst="rect">
+              <a:avLst/>
+            </a:prstGeom>
+            <a:ln>
+              <a:noFill/>
+            </a:ln>
+          </p:spPr>
+        </p:pic>
+        <p:sp>
+          <p:nvSpPr>
+            <p:cNvPr id="12" name="TextBox 11">
+              <a:extLst>
+                <a:ext uri="{FF2B5EF4-FFF2-40B4-BE49-F238E27FC236}">
+                  <a16:creationId xmlns:a16="http://schemas.microsoft.com/office/drawing/2014/main" id="{FEA5DCD5-D124-5120-7FB4-275C30B94938}"/>
+                </a:ext>
+              </a:extLst>
+            </p:cNvPr>
+            <p:cNvSpPr txBox="1"/>
+            <p:nvPr/>
+          </p:nvSpPr>
+          <p:spPr>
+            <a:xfrm>
+              <a:off x="4943317" y="3039017"/>
+              <a:ext cx="282450" cy="246221"/>
+            </a:xfrm>
+            <a:prstGeom prst="rect">
+              <a:avLst/>
+            </a:prstGeom>
+            <a:noFill/>
+            <a:ln>
+              <a:noFill/>
+            </a:ln>
+          </p:spPr>
+          <p:txBody>
+            <a:bodyPr wrap="none" rtlCol="0">
+              <a:spAutoFit/>
+            </a:bodyPr>
+            <a:lstStyle/>
+            <a:p>
+              <a:r>
+                <a:rPr lang="en-GB" sz="1000" dirty="0">
+                  <a:solidFill>
+                    <a:srgbClr val="FF0000"/>
+                  </a:solidFill>
+                </a:rPr>
+                <a:t>3.</a:t>
+              </a:r>
+              <a:endParaRPr lang="en-NL" sz="1000" dirty="0">
+                <a:solidFill>
+                  <a:srgbClr val="FF0000"/>
+                </a:solidFill>
+              </a:endParaRPr>
+            </a:p>
+          </p:txBody>
+        </p:sp>
+        <p:sp>
+          <p:nvSpPr>
+            <p:cNvPr id="13" name="TextBox 12">
+              <a:extLst>
+                <a:ext uri="{FF2B5EF4-FFF2-40B4-BE49-F238E27FC236}">
+                  <a16:creationId xmlns:a16="http://schemas.microsoft.com/office/drawing/2014/main" id="{059A676B-F733-AA30-2998-7D4553C3EB3F}"/>
+                </a:ext>
+              </a:extLst>
+            </p:cNvPr>
+            <p:cNvSpPr txBox="1"/>
+            <p:nvPr/>
+          </p:nvSpPr>
+          <p:spPr>
+            <a:xfrm>
+              <a:off x="5040594" y="3233571"/>
+              <a:ext cx="282450" cy="246221"/>
+            </a:xfrm>
+            <a:prstGeom prst="rect">
+              <a:avLst/>
+            </a:prstGeom>
+            <a:noFill/>
+            <a:ln>
+              <a:noFill/>
+            </a:ln>
+          </p:spPr>
+          <p:txBody>
+            <a:bodyPr wrap="none" rtlCol="0">
+              <a:spAutoFit/>
+            </a:bodyPr>
+            <a:lstStyle/>
+            <a:p>
+              <a:r>
+                <a:rPr lang="en-GB" sz="1000" dirty="0">
+                  <a:solidFill>
+                    <a:srgbClr val="FF0000"/>
+                  </a:solidFill>
+                </a:rPr>
+                <a:t>4.</a:t>
+              </a:r>
+              <a:endParaRPr lang="en-NL" sz="1000" dirty="0">
+                <a:solidFill>
+                  <a:srgbClr val="FF0000"/>
+                </a:solidFill>
+              </a:endParaRPr>
+            </a:p>
+          </p:txBody>
+        </p:sp>
+      </p:grpSp>
+      <p:grpSp>
+        <p:nvGrpSpPr>
+          <p:cNvPr id="18" name="Group 17">
+            <a:extLst>
+              <a:ext uri="{FF2B5EF4-FFF2-40B4-BE49-F238E27FC236}">
+                <a16:creationId xmlns:a16="http://schemas.microsoft.com/office/drawing/2014/main" id="{B947BA91-C60A-1ACF-6283-D84B424D1084}"/>
+              </a:ext>
+            </a:extLst>
+          </p:cNvPr>
+          <p:cNvGrpSpPr/>
+          <p:nvPr/>
+        </p:nvGrpSpPr>
+        <p:grpSpPr>
+          <a:xfrm>
+            <a:off x="1698637" y="3582348"/>
+            <a:ext cx="3572374" cy="1514686"/>
+            <a:chOff x="1698637" y="3582348"/>
+            <a:chExt cx="3572374" cy="1514686"/>
+          </a:xfrm>
+        </p:grpSpPr>
+        <p:pic>
+          <p:nvPicPr>
+            <p:cNvPr id="4" name="Picture 3">
+              <a:extLst>
+                <a:ext uri="{FF2B5EF4-FFF2-40B4-BE49-F238E27FC236}">
+                  <a16:creationId xmlns:a16="http://schemas.microsoft.com/office/drawing/2014/main" id="{2F11F813-CF4C-8938-26D4-FA0EB942C982}"/>
+                </a:ext>
+              </a:extLst>
+            </p:cNvPr>
+            <p:cNvPicPr>
+              <a:picLocks noChangeAspect="1"/>
+            </p:cNvPicPr>
+            <p:nvPr/>
+          </p:nvPicPr>
+          <p:blipFill>
+            <a:blip r:embed="rId4"/>
+            <a:stretch>
+              <a:fillRect/>
+            </a:stretch>
+          </p:blipFill>
+          <p:spPr>
+            <a:xfrm>
+              <a:off x="1698637" y="3582348"/>
+              <a:ext cx="3572374" cy="1514686"/>
+            </a:xfrm>
+            <a:prstGeom prst="rect">
+              <a:avLst/>
+            </a:prstGeom>
+            <a:ln>
+              <a:noFill/>
+            </a:ln>
+          </p:spPr>
+        </p:pic>
+        <p:sp>
+          <p:nvSpPr>
+            <p:cNvPr id="14" name="TextBox 13">
+              <a:extLst>
+                <a:ext uri="{FF2B5EF4-FFF2-40B4-BE49-F238E27FC236}">
+                  <a16:creationId xmlns:a16="http://schemas.microsoft.com/office/drawing/2014/main" id="{0250BE43-23CF-6094-AA8D-4BA9825D3D1A}"/>
+                </a:ext>
+              </a:extLst>
+            </p:cNvPr>
+            <p:cNvSpPr txBox="1"/>
+            <p:nvPr/>
+          </p:nvSpPr>
+          <p:spPr>
+            <a:xfrm>
+              <a:off x="4787675" y="4550048"/>
+              <a:ext cx="282450" cy="246221"/>
+            </a:xfrm>
+            <a:prstGeom prst="rect">
+              <a:avLst/>
+            </a:prstGeom>
+            <a:noFill/>
+            <a:ln>
+              <a:noFill/>
+            </a:ln>
+          </p:spPr>
+          <p:txBody>
+            <a:bodyPr wrap="none" rtlCol="0">
+              <a:spAutoFit/>
+            </a:bodyPr>
+            <a:lstStyle/>
+            <a:p>
+              <a:r>
+                <a:rPr lang="en-GB" sz="1000" dirty="0">
+                  <a:solidFill>
+                    <a:srgbClr val="FF0000"/>
+                  </a:solidFill>
+                </a:rPr>
+                <a:t>5.</a:t>
+              </a:r>
+              <a:endParaRPr lang="en-NL" sz="1000" dirty="0">
+                <a:solidFill>
+                  <a:srgbClr val="FF0000"/>
+                </a:solidFill>
+              </a:endParaRPr>
+            </a:p>
+          </p:txBody>
+        </p:sp>
+        <p:sp>
+          <p:nvSpPr>
+            <p:cNvPr id="15" name="TextBox 14">
+              <a:extLst>
+                <a:ext uri="{FF2B5EF4-FFF2-40B4-BE49-F238E27FC236}">
+                  <a16:creationId xmlns:a16="http://schemas.microsoft.com/office/drawing/2014/main" id="{581C5F47-30F1-6F2D-6A20-79A0F1ABBB37}"/>
+                </a:ext>
+              </a:extLst>
+            </p:cNvPr>
+            <p:cNvSpPr txBox="1"/>
+            <p:nvPr/>
+          </p:nvSpPr>
+          <p:spPr>
+            <a:xfrm>
+              <a:off x="4803888" y="4747844"/>
+              <a:ext cx="282450" cy="246221"/>
+            </a:xfrm>
+            <a:prstGeom prst="rect">
+              <a:avLst/>
+            </a:prstGeom>
+            <a:noFill/>
+            <a:ln>
+              <a:noFill/>
+            </a:ln>
+          </p:spPr>
+          <p:txBody>
+            <a:bodyPr wrap="none" rtlCol="0">
+              <a:spAutoFit/>
+            </a:bodyPr>
+            <a:lstStyle/>
+            <a:p>
+              <a:r>
+                <a:rPr lang="en-GB" sz="1000" dirty="0">
+                  <a:solidFill>
+                    <a:srgbClr val="FF0000"/>
+                  </a:solidFill>
+                </a:rPr>
+                <a:t>6.</a:t>
+              </a:r>
+              <a:endParaRPr lang="en-NL" sz="1000" dirty="0">
+                <a:solidFill>
+                  <a:srgbClr val="FF0000"/>
+                </a:solidFill>
+              </a:endParaRPr>
+            </a:p>
+          </p:txBody>
+        </p:sp>
+      </p:grpSp>
+      <p:pic>
+        <p:nvPicPr>
+          <p:cNvPr id="20" name="Picture 19">
+            <a:extLst>
+              <a:ext uri="{FF2B5EF4-FFF2-40B4-BE49-F238E27FC236}">
+                <a16:creationId xmlns:a16="http://schemas.microsoft.com/office/drawing/2014/main" id="{771EA4F5-EFE8-4630-582F-A8EB45053E00}"/>
+              </a:ext>
+            </a:extLst>
+          </p:cNvPr>
+          <p:cNvPicPr>
+            <a:picLocks noChangeAspect="1"/>
+          </p:cNvPicPr>
+          <p:nvPr/>
+        </p:nvPicPr>
+        <p:blipFill>
+          <a:blip r:embed="rId5"/>
+          <a:stretch>
+            <a:fillRect/>
+          </a:stretch>
+        </p:blipFill>
+        <p:spPr>
+          <a:xfrm>
+            <a:off x="6313975" y="2011636"/>
+            <a:ext cx="2676899" cy="1228896"/>
+          </a:xfrm>
+          <a:prstGeom prst="rect">
+            <a:avLst/>
+          </a:prstGeom>
+        </p:spPr>
+      </p:pic>
+      <p:sp>
+        <p:nvSpPr>
+          <p:cNvPr id="23" name="TextBox 22">
+            <a:extLst>
+              <a:ext uri="{FF2B5EF4-FFF2-40B4-BE49-F238E27FC236}">
+                <a16:creationId xmlns:a16="http://schemas.microsoft.com/office/drawing/2014/main" id="{AD2E90AD-7683-2FCA-5FD3-3827038D622B}"/>
+              </a:ext>
+            </a:extLst>
+          </p:cNvPr>
+          <p:cNvSpPr txBox="1"/>
+          <p:nvPr/>
+        </p:nvSpPr>
+        <p:spPr>
+          <a:xfrm>
+            <a:off x="7887557" y="2468071"/>
+            <a:ext cx="282450" cy="246221"/>
+          </a:xfrm>
+          <a:prstGeom prst="rect">
+            <a:avLst/>
+          </a:prstGeom>
+          <a:noFill/>
+          <a:ln>
+            <a:noFill/>
+          </a:ln>
+        </p:spPr>
+        <p:txBody>
+          <a:bodyPr wrap="none" rtlCol="0">
+            <a:spAutoFit/>
+          </a:bodyPr>
+          <a:lstStyle/>
+          <a:p>
+            <a:r>
+              <a:rPr lang="en-GB" sz="1000" dirty="0">
+                <a:solidFill>
+                  <a:srgbClr val="FF0000"/>
+                </a:solidFill>
+              </a:rPr>
+              <a:t>1.</a:t>
+            </a:r>
+            <a:endParaRPr lang="en-NL" sz="1000" dirty="0">
+              <a:solidFill>
+                <a:srgbClr val="FF0000"/>
+              </a:solidFill>
+            </a:endParaRPr>
+          </a:p>
+        </p:txBody>
+      </p:sp>
+      <p:sp>
+        <p:nvSpPr>
+          <p:cNvPr id="24" name="TextBox 23">
+            <a:extLst>
+              <a:ext uri="{FF2B5EF4-FFF2-40B4-BE49-F238E27FC236}">
+                <a16:creationId xmlns:a16="http://schemas.microsoft.com/office/drawing/2014/main" id="{4421FB89-72FF-E3B3-5DD1-813B466ED7DE}"/>
+              </a:ext>
+            </a:extLst>
+          </p:cNvPr>
+          <p:cNvSpPr txBox="1"/>
+          <p:nvPr/>
+        </p:nvSpPr>
+        <p:spPr>
+          <a:xfrm>
+            <a:off x="8383667" y="2468071"/>
+            <a:ext cx="550151" cy="246221"/>
+          </a:xfrm>
+          <a:prstGeom prst="rect">
+            <a:avLst/>
+          </a:prstGeom>
+          <a:noFill/>
+          <a:ln>
+            <a:noFill/>
+          </a:ln>
+        </p:spPr>
+        <p:txBody>
+          <a:bodyPr wrap="none" rtlCol="0">
+            <a:spAutoFit/>
+          </a:bodyPr>
+          <a:lstStyle/>
+          <a:p>
+            <a:r>
+              <a:rPr lang="en-GB" sz="1000" dirty="0">
+                <a:solidFill>
+                  <a:srgbClr val="FF0000"/>
+                </a:solidFill>
+              </a:rPr>
+              <a:t>2. or 3.</a:t>
+            </a:r>
+            <a:endParaRPr lang="en-NL" sz="1000" dirty="0">
+              <a:solidFill>
+                <a:srgbClr val="FF0000"/>
+              </a:solidFill>
+            </a:endParaRPr>
+          </a:p>
+        </p:txBody>
+      </p:sp>
+      <p:pic>
+        <p:nvPicPr>
+          <p:cNvPr id="26" name="Picture 25">
+            <a:extLst>
+              <a:ext uri="{FF2B5EF4-FFF2-40B4-BE49-F238E27FC236}">
+                <a16:creationId xmlns:a16="http://schemas.microsoft.com/office/drawing/2014/main" id="{E7ECCD49-786C-39E2-ABDB-6AE69B40E730}"/>
+              </a:ext>
+            </a:extLst>
+          </p:cNvPr>
+          <p:cNvPicPr>
+            <a:picLocks noChangeAspect="1"/>
+          </p:cNvPicPr>
+          <p:nvPr/>
+        </p:nvPicPr>
+        <p:blipFill rotWithShape="1">
+          <a:blip r:embed="rId6"/>
+          <a:srcRect l="1265" r="-1"/>
+          <a:stretch/>
+        </p:blipFill>
+        <p:spPr>
+          <a:xfrm>
+            <a:off x="6348919" y="3348998"/>
+            <a:ext cx="2727692" cy="1324160"/>
+          </a:xfrm>
+          <a:prstGeom prst="rect">
+            <a:avLst/>
+          </a:prstGeom>
+        </p:spPr>
+      </p:pic>
+      <p:sp>
+        <p:nvSpPr>
+          <p:cNvPr id="27" name="TextBox 26">
+            <a:extLst>
+              <a:ext uri="{FF2B5EF4-FFF2-40B4-BE49-F238E27FC236}">
+                <a16:creationId xmlns:a16="http://schemas.microsoft.com/office/drawing/2014/main" id="{7DF2CB00-26CC-3201-9BFB-5BCDC760679B}"/>
+              </a:ext>
+            </a:extLst>
+          </p:cNvPr>
+          <p:cNvSpPr txBox="1"/>
+          <p:nvPr/>
+        </p:nvSpPr>
+        <p:spPr>
+          <a:xfrm>
+            <a:off x="6373285" y="4079620"/>
+            <a:ext cx="282450" cy="246221"/>
+          </a:xfrm>
+          <a:prstGeom prst="rect">
+            <a:avLst/>
+          </a:prstGeom>
+          <a:noFill/>
+          <a:ln>
+            <a:noFill/>
+          </a:ln>
+        </p:spPr>
+        <p:txBody>
+          <a:bodyPr wrap="none" rtlCol="0">
+            <a:spAutoFit/>
+          </a:bodyPr>
+          <a:lstStyle/>
+          <a:p>
+            <a:r>
+              <a:rPr lang="en-GB" sz="1000" dirty="0">
+                <a:solidFill>
+                  <a:srgbClr val="FF0000"/>
+                </a:solidFill>
+              </a:rPr>
+              <a:t>1.</a:t>
+            </a:r>
+            <a:endParaRPr lang="en-NL" sz="1000" dirty="0">
+              <a:solidFill>
+                <a:srgbClr val="FF0000"/>
+              </a:solidFill>
+            </a:endParaRPr>
+          </a:p>
+        </p:txBody>
+      </p:sp>
+      <p:sp>
+        <p:nvSpPr>
+          <p:cNvPr id="28" name="TextBox 27">
+            <a:extLst>
+              <a:ext uri="{FF2B5EF4-FFF2-40B4-BE49-F238E27FC236}">
+                <a16:creationId xmlns:a16="http://schemas.microsoft.com/office/drawing/2014/main" id="{FE521176-3E5D-B851-3254-10C4DE6495C2}"/>
+              </a:ext>
+            </a:extLst>
+          </p:cNvPr>
+          <p:cNvSpPr txBox="1"/>
+          <p:nvPr/>
+        </p:nvSpPr>
+        <p:spPr>
+          <a:xfrm>
+            <a:off x="6869395" y="4079620"/>
+            <a:ext cx="550151" cy="246221"/>
+          </a:xfrm>
+          <a:prstGeom prst="rect">
+            <a:avLst/>
+          </a:prstGeom>
+          <a:noFill/>
+          <a:ln>
+            <a:noFill/>
+          </a:ln>
+        </p:spPr>
+        <p:txBody>
+          <a:bodyPr wrap="none" rtlCol="0">
+            <a:spAutoFit/>
+          </a:bodyPr>
+          <a:lstStyle/>
+          <a:p>
+            <a:r>
+              <a:rPr lang="en-GB" sz="1000" dirty="0">
+                <a:solidFill>
+                  <a:srgbClr val="FF0000"/>
+                </a:solidFill>
+              </a:rPr>
+              <a:t>2. or 3.</a:t>
+            </a:r>
+            <a:endParaRPr lang="en-NL" sz="1000" dirty="0">
+              <a:solidFill>
+                <a:srgbClr val="FF0000"/>
+              </a:solidFill>
+            </a:endParaRPr>
+          </a:p>
+        </p:txBody>
+      </p:sp>
+    </p:spTree>
+    <p:extLst>
+      <p:ext uri="{BB962C8B-B14F-4D97-AF65-F5344CB8AC3E}">
+        <p14:creationId xmlns:p14="http://schemas.microsoft.com/office/powerpoint/2010/main" val="3031865952"/>
+      </p:ext>
+    </p:extLst>
+  </p:cSld>
+  <p:clrMapOvr>
+    <a:masterClrMapping/>
+  </p:clrMapOvr>
+</p:sld>
+</file>
+
 <file path=ppt/theme/theme1.xml><?xml version="1.0" encoding="utf-8"?>
 <a:theme xmlns:a="http://schemas.openxmlformats.org/drawingml/2006/main" name="Office Theme">
   <a:themeElements>

</xml_diff>